<commit_message>
Update 46046-life science ppt templates.pptx
</commit_message>
<xml_diff>
--- a/psd/46046-life science ppt templates.pptx
+++ b/psd/46046-life science ppt templates.pptx
@@ -6,6 +6,7 @@
   </p:sldMasterIdLst>
   <p:sldIdLst>
     <p:sldId id="257" r:id="rId2"/>
+    <p:sldId id="258" r:id="rId3"/>
   </p:sldIdLst>
   <p:sldSz cx="12192000" cy="6858000"/>
   <p:notesSz cx="6858000" cy="9144000"/>
@@ -2333,6 +2334,13 @@
           <a:ln>
             <a:noFill/>
           </a:ln>
+          <a:effectLst>
+            <a:outerShdw blurRad="355600" sx="102000" sy="102000" algn="ctr" rotWithShape="0">
+              <a:prstClr val="black">
+                <a:alpha val="26000"/>
+              </a:prstClr>
+            </a:outerShdw>
+          </a:effectLst>
         </p:spPr>
         <p:style>
           <a:lnRef idx="2">
@@ -2577,7 +2585,7 @@
         </p:blipFill>
         <p:spPr>
           <a:xfrm>
-            <a:off x="11032726" y="5035573"/>
+            <a:off x="11146521" y="5186903"/>
             <a:ext cx="878183" cy="1534572"/>
           </a:xfrm>
           <a:prstGeom prst="rect">
@@ -4418,9 +4426,19 @@
 <p:sldMaster xmlns:a="http://schemas.openxmlformats.org/drawingml/2006/main" xmlns:r="http://schemas.openxmlformats.org/officeDocument/2006/relationships" xmlns:p="http://schemas.openxmlformats.org/presentationml/2006/main">
   <p:cSld>
     <p:bg>
-      <p:bgRef idx="1001">
-        <a:schemeClr val="bg1"/>
-      </p:bgRef>
+      <p:bgPr>
+        <a:pattFill prst="pct5">
+          <a:fgClr>
+            <a:schemeClr val="bg1">
+              <a:lumMod val="85000"/>
+            </a:schemeClr>
+          </a:fgClr>
+          <a:bgClr>
+            <a:schemeClr val="bg1"/>
+          </a:bgClr>
+        </a:pattFill>
+        <a:effectLst/>
+      </p:bgPr>
     </p:bg>
     <p:spTree>
       <p:nvGrpSpPr>
@@ -5064,6 +5082,86 @@
 </p:sld>
 </file>
 
+<file path=ppt/slides/slide2.xml><?xml version="1.0" encoding="utf-8"?>
+<p:sld xmlns:a="http://schemas.openxmlformats.org/drawingml/2006/main" xmlns:r="http://schemas.openxmlformats.org/officeDocument/2006/relationships" xmlns:p="http://schemas.openxmlformats.org/presentationml/2006/main">
+  <p:cSld>
+    <p:spTree>
+      <p:nvGrpSpPr>
+        <p:cNvPr id="1" name=""/>
+        <p:cNvGrpSpPr/>
+        <p:nvPr/>
+      </p:nvGrpSpPr>
+      <p:grpSpPr>
+        <a:xfrm>
+          <a:off x="0" y="0"/>
+          <a:ext cx="0" cy="0"/>
+          <a:chOff x="0" y="0"/>
+          <a:chExt cx="0" cy="0"/>
+        </a:xfrm>
+      </p:grpSpPr>
+      <p:sp>
+        <p:nvSpPr>
+          <p:cNvPr id="2" name="Title 1">
+            <a:extLst>
+              <a:ext uri="{FF2B5EF4-FFF2-40B4-BE49-F238E27FC236}">
+                <a16:creationId xmlns:a16="http://schemas.microsoft.com/office/drawing/2014/main" id="{BEE57282-7201-489A-9DA8-1EE640700F29}"/>
+              </a:ext>
+            </a:extLst>
+          </p:cNvPr>
+          <p:cNvSpPr>
+            <a:spLocks noGrp="1"/>
+          </p:cNvSpPr>
+          <p:nvPr>
+            <p:ph type="title"/>
+          </p:nvPr>
+        </p:nvSpPr>
+        <p:spPr/>
+        <p:txBody>
+          <a:bodyPr/>
+          <a:lstStyle/>
+          <a:p>
+            <a:endParaRPr lang="zh-CN" altLang="en-US"/>
+          </a:p>
+        </p:txBody>
+      </p:sp>
+      <p:sp>
+        <p:nvSpPr>
+          <p:cNvPr id="3" name="Content Placeholder 2">
+            <a:extLst>
+              <a:ext uri="{FF2B5EF4-FFF2-40B4-BE49-F238E27FC236}">
+                <a16:creationId xmlns:a16="http://schemas.microsoft.com/office/drawing/2014/main" id="{012B8561-AE15-47CE-8405-09DA207617BB}"/>
+              </a:ext>
+            </a:extLst>
+          </p:cNvPr>
+          <p:cNvSpPr>
+            <a:spLocks noGrp="1"/>
+          </p:cNvSpPr>
+          <p:nvPr>
+            <p:ph idx="1"/>
+          </p:nvPr>
+        </p:nvSpPr>
+        <p:spPr/>
+        <p:txBody>
+          <a:bodyPr/>
+          <a:lstStyle/>
+          <a:p>
+            <a:endParaRPr lang="zh-CN" altLang="en-US"/>
+          </a:p>
+        </p:txBody>
+      </p:sp>
+    </p:spTree>
+    <p:extLst>
+      <p:ext uri="{BB962C8B-B14F-4D97-AF65-F5344CB8AC3E}">
+        <p14:creationId xmlns:p14="http://schemas.microsoft.com/office/powerpoint/2010/main" val="3462909212"/>
+      </p:ext>
+    </p:extLst>
+  </p:cSld>
+  <p:clrMapOvr>
+    <a:masterClrMapping/>
+  </p:clrMapOvr>
+</p:sld>
+</file>
+
 <file path=ppt/theme/theme1.xml><?xml version="1.0" encoding="utf-8"?>
 <a:theme xmlns:a="http://schemas.openxmlformats.org/drawingml/2006/main" name="Office Theme">
   <a:themeElements>

</xml_diff>